<commit_message>
Added video link in ppt
</commit_message>
<xml_diff>
--- a/Iteration 3/Iteration-3_Presentation.pptx
+++ b/Iteration 3/Iteration-3_Presentation.pptx
@@ -8,10 +8,10 @@
     <p:sldId id="256" r:id="rId2"/>
     <p:sldId id="266" r:id="rId3"/>
     <p:sldId id="262" r:id="rId4"/>
-    <p:sldId id="267" r:id="rId5"/>
-    <p:sldId id="268" r:id="rId6"/>
-    <p:sldId id="259" r:id="rId7"/>
-    <p:sldId id="261" r:id="rId8"/>
+    <p:sldId id="261" r:id="rId5"/>
+    <p:sldId id="267" r:id="rId6"/>
+    <p:sldId id="268" r:id="rId7"/>
+    <p:sldId id="259" r:id="rId8"/>
     <p:sldId id="265" r:id="rId9"/>
   </p:sldIdLst>
   <p:sldSz cx="12192000" cy="6858000"/>
@@ -6452,6 +6452,109 @@
 <file path=ppt/slides/slide4.xml><?xml version="1.0" encoding="utf-8"?>
 <p:sld xmlns:a="http://schemas.openxmlformats.org/drawingml/2006/main" xmlns:r="http://schemas.openxmlformats.org/officeDocument/2006/relationships" xmlns:p="http://schemas.openxmlformats.org/presentationml/2006/main">
   <p:cSld>
+    <p:spTree>
+      <p:nvGrpSpPr>
+        <p:cNvPr id="1" name=""/>
+        <p:cNvGrpSpPr/>
+        <p:nvPr/>
+      </p:nvGrpSpPr>
+      <p:grpSpPr>
+        <a:xfrm>
+          <a:off x="0" y="0"/>
+          <a:ext cx="0" cy="0"/>
+          <a:chOff x="0" y="0"/>
+          <a:chExt cx="0" cy="0"/>
+        </a:xfrm>
+      </p:grpSpPr>
+      <p:sp>
+        <p:nvSpPr>
+          <p:cNvPr id="2" name="TextBox 1">
+            <a:extLst>
+              <a:ext uri="{FF2B5EF4-FFF2-40B4-BE49-F238E27FC236}">
+                <a16:creationId xmlns:a16="http://schemas.microsoft.com/office/drawing/2014/main" id="{042831A8-7303-4EB7-B138-47FC924A6D97}"/>
+              </a:ext>
+            </a:extLst>
+          </p:cNvPr>
+          <p:cNvSpPr txBox="1"/>
+          <p:nvPr/>
+        </p:nvSpPr>
+        <p:spPr>
+          <a:xfrm>
+            <a:off x="730526" y="1565413"/>
+            <a:ext cx="8090452" cy="369332"/>
+          </a:xfrm>
+          <a:prstGeom prst="rect">
+            <a:avLst/>
+          </a:prstGeom>
+          <a:noFill/>
+        </p:spPr>
+        <p:txBody>
+          <a:bodyPr wrap="square" rtlCol="0">
+            <a:spAutoFit/>
+          </a:bodyPr>
+          <a:lstStyle/>
+          <a:p>
+            <a:r>
+              <a:rPr lang="en-US" dirty="0">
+                <a:hlinkClick r:id="rId2"/>
+              </a:rPr>
+              <a:t>https://www.youtube.com/watch?v=TncPhi9kSU4&amp;feature=youtu.be</a:t>
+            </a:r>
+            <a:endParaRPr lang="en-US" dirty="0"/>
+          </a:p>
+        </p:txBody>
+      </p:sp>
+      <p:sp>
+        <p:nvSpPr>
+          <p:cNvPr id="3" name="TextBox 2">
+            <a:extLst>
+              <a:ext uri="{FF2B5EF4-FFF2-40B4-BE49-F238E27FC236}">
+                <a16:creationId xmlns:a16="http://schemas.microsoft.com/office/drawing/2014/main" id="{129DF7F7-BBBF-473B-82E9-347411BECEEE}"/>
+              </a:ext>
+            </a:extLst>
+          </p:cNvPr>
+          <p:cNvSpPr txBox="1"/>
+          <p:nvPr/>
+        </p:nvSpPr>
+        <p:spPr>
+          <a:xfrm>
+            <a:off x="730526" y="352839"/>
+            <a:ext cx="6713883" cy="369332"/>
+          </a:xfrm>
+          <a:prstGeom prst="rect">
+            <a:avLst/>
+          </a:prstGeom>
+          <a:noFill/>
+        </p:spPr>
+        <p:txBody>
+          <a:bodyPr wrap="square" rtlCol="0">
+            <a:spAutoFit/>
+          </a:bodyPr>
+          <a:lstStyle/>
+          <a:p>
+            <a:r>
+              <a:rPr lang="en-US" dirty="0"/>
+              <a:t>Video Demo</a:t>
+            </a:r>
+          </a:p>
+        </p:txBody>
+      </p:sp>
+    </p:spTree>
+    <p:extLst>
+      <p:ext uri="{BB962C8B-B14F-4D97-AF65-F5344CB8AC3E}">
+        <p14:creationId xmlns:p14="http://schemas.microsoft.com/office/powerpoint/2010/main" val="1494503666"/>
+      </p:ext>
+    </p:extLst>
+  </p:cSld>
+  <p:clrMapOvr>
+    <a:masterClrMapping/>
+  </p:clrMapOvr>
+</p:sld>
+</file>
+
+<file path=ppt/slides/slide5.xml><?xml version="1.0" encoding="utf-8"?>
+<p:sld xmlns:a="http://schemas.openxmlformats.org/drawingml/2006/main" xmlns:r="http://schemas.openxmlformats.org/officeDocument/2006/relationships" xmlns:p="http://schemas.openxmlformats.org/presentationml/2006/main">
+  <p:cSld>
     <p:bg>
       <p:bgPr>
         <a:blipFill>
@@ -6554,7 +6657,7 @@
 </p:sld>
 </file>
 
-<file path=ppt/slides/slide5.xml><?xml version="1.0" encoding="utf-8"?>
+<file path=ppt/slides/slide6.xml><?xml version="1.0" encoding="utf-8"?>
 <p:sld xmlns:a="http://schemas.openxmlformats.org/drawingml/2006/main" xmlns:r="http://schemas.openxmlformats.org/officeDocument/2006/relationships" xmlns:p="http://schemas.openxmlformats.org/presentationml/2006/main">
   <p:cSld>
     <p:bg>
@@ -6624,7 +6727,7 @@
 </p:sld>
 </file>
 
-<file path=ppt/slides/slide6.xml><?xml version="1.0" encoding="utf-8"?>
+<file path=ppt/slides/slide7.xml><?xml version="1.0" encoding="utf-8"?>
 <p:sld xmlns:a="http://schemas.openxmlformats.org/drawingml/2006/main" xmlns:r="http://schemas.openxmlformats.org/officeDocument/2006/relationships" xmlns:p="http://schemas.openxmlformats.org/presentationml/2006/main">
   <p:cSld>
     <p:spTree>
@@ -6705,36 +6808,6 @@
     <p:extLst>
       <p:ext uri="{BB962C8B-B14F-4D97-AF65-F5344CB8AC3E}">
         <p14:creationId xmlns:p14="http://schemas.microsoft.com/office/powerpoint/2010/main" val="990452718"/>
-      </p:ext>
-    </p:extLst>
-  </p:cSld>
-  <p:clrMapOvr>
-    <a:masterClrMapping/>
-  </p:clrMapOvr>
-</p:sld>
-</file>
-
-<file path=ppt/slides/slide7.xml><?xml version="1.0" encoding="utf-8"?>
-<p:sld xmlns:a="http://schemas.openxmlformats.org/drawingml/2006/main" xmlns:r="http://schemas.openxmlformats.org/officeDocument/2006/relationships" xmlns:p="http://schemas.openxmlformats.org/presentationml/2006/main">
-  <p:cSld>
-    <p:spTree>
-      <p:nvGrpSpPr>
-        <p:cNvPr id="1" name=""/>
-        <p:cNvGrpSpPr/>
-        <p:nvPr/>
-      </p:nvGrpSpPr>
-      <p:grpSpPr>
-        <a:xfrm>
-          <a:off x="0" y="0"/>
-          <a:ext cx="0" cy="0"/>
-          <a:chOff x="0" y="0"/>
-          <a:chExt cx="0" cy="0"/>
-        </a:xfrm>
-      </p:grpSpPr>
-    </p:spTree>
-    <p:extLst>
-      <p:ext uri="{BB962C8B-B14F-4D97-AF65-F5344CB8AC3E}">
-        <p14:creationId xmlns:p14="http://schemas.microsoft.com/office/powerpoint/2010/main" val="1494503666"/>
       </p:ext>
     </p:extLst>
   </p:cSld>

</xml_diff>